<commit_message>
With the correct image this time.
</commit_message>
<xml_diff>
--- a/resources/diagrams.pptx
+++ b/resources/diagrams.pptx
@@ -6,6 +6,7 @@
   </p:sldMasterIdLst>
   <p:sldIdLst>
     <p:sldId id="257" r:id="rId2"/>
+    <p:sldId id="256" r:id="rId3"/>
   </p:sldIdLst>
   <p:sldSz cx="12192000" cy="6858000"/>
   <p:notesSz cx="6858000" cy="9144000"/>
@@ -104,6 +105,11 @@
       </a:defRPr>
     </a:lvl9pPr>
   </p:defaultTextStyle>
+  <p:extLst>
+    <p:ext uri="{EFAFB233-063F-42B5-8137-9DF3F51BA10A}">
+      <p15:sldGuideLst xmlns:p15="http://schemas.microsoft.com/office/powerpoint/2012/main"/>
+    </p:ext>
+  </p:extLst>
 </p:presentation>
 </file>
 
@@ -254,7 +260,7 @@
           <a:p>
             <a:fld id="{F6FBCA6B-5BBD-4027-BE90-56FA1D5E4F5A}" type="datetimeFigureOut">
               <a:rPr lang="en-US" smtClean="0"/>
-              <a:t>3/29/2022</a:t>
+              <a:t>12/28/2023</a:t>
             </a:fld>
             <a:endParaRPr lang="en-US"/>
           </a:p>
@@ -452,7 +458,7 @@
           <a:p>
             <a:fld id="{F6FBCA6B-5BBD-4027-BE90-56FA1D5E4F5A}" type="datetimeFigureOut">
               <a:rPr lang="en-US" smtClean="0"/>
-              <a:t>3/29/2022</a:t>
+              <a:t>12/28/2023</a:t>
             </a:fld>
             <a:endParaRPr lang="en-US"/>
           </a:p>
@@ -660,7 +666,7 @@
           <a:p>
             <a:fld id="{F6FBCA6B-5BBD-4027-BE90-56FA1D5E4F5A}" type="datetimeFigureOut">
               <a:rPr lang="en-US" smtClean="0"/>
-              <a:t>3/29/2022</a:t>
+              <a:t>12/28/2023</a:t>
             </a:fld>
             <a:endParaRPr lang="en-US"/>
           </a:p>
@@ -858,7 +864,7 @@
           <a:p>
             <a:fld id="{F6FBCA6B-5BBD-4027-BE90-56FA1D5E4F5A}" type="datetimeFigureOut">
               <a:rPr lang="en-US" smtClean="0"/>
-              <a:t>3/29/2022</a:t>
+              <a:t>12/28/2023</a:t>
             </a:fld>
             <a:endParaRPr lang="en-US"/>
           </a:p>
@@ -1133,7 +1139,7 @@
           <a:p>
             <a:fld id="{F6FBCA6B-5BBD-4027-BE90-56FA1D5E4F5A}" type="datetimeFigureOut">
               <a:rPr lang="en-US" smtClean="0"/>
-              <a:t>3/29/2022</a:t>
+              <a:t>12/28/2023</a:t>
             </a:fld>
             <a:endParaRPr lang="en-US"/>
           </a:p>
@@ -1398,7 +1404,7 @@
           <a:p>
             <a:fld id="{F6FBCA6B-5BBD-4027-BE90-56FA1D5E4F5A}" type="datetimeFigureOut">
               <a:rPr lang="en-US" smtClean="0"/>
-              <a:t>3/29/2022</a:t>
+              <a:t>12/28/2023</a:t>
             </a:fld>
             <a:endParaRPr lang="en-US"/>
           </a:p>
@@ -1810,7 +1816,7 @@
           <a:p>
             <a:fld id="{F6FBCA6B-5BBD-4027-BE90-56FA1D5E4F5A}" type="datetimeFigureOut">
               <a:rPr lang="en-US" smtClean="0"/>
-              <a:t>3/29/2022</a:t>
+              <a:t>12/28/2023</a:t>
             </a:fld>
             <a:endParaRPr lang="en-US"/>
           </a:p>
@@ -1951,7 +1957,7 @@
           <a:p>
             <a:fld id="{F6FBCA6B-5BBD-4027-BE90-56FA1D5E4F5A}" type="datetimeFigureOut">
               <a:rPr lang="en-US" smtClean="0"/>
-              <a:t>3/29/2022</a:t>
+              <a:t>12/28/2023</a:t>
             </a:fld>
             <a:endParaRPr lang="en-US"/>
           </a:p>
@@ -2064,7 +2070,7 @@
           <a:p>
             <a:fld id="{F6FBCA6B-5BBD-4027-BE90-56FA1D5E4F5A}" type="datetimeFigureOut">
               <a:rPr lang="en-US" smtClean="0"/>
-              <a:t>3/29/2022</a:t>
+              <a:t>12/28/2023</a:t>
             </a:fld>
             <a:endParaRPr lang="en-US"/>
           </a:p>
@@ -2375,7 +2381,7 @@
           <a:p>
             <a:fld id="{F6FBCA6B-5BBD-4027-BE90-56FA1D5E4F5A}" type="datetimeFigureOut">
               <a:rPr lang="en-US" smtClean="0"/>
-              <a:t>3/29/2022</a:t>
+              <a:t>12/28/2023</a:t>
             </a:fld>
             <a:endParaRPr lang="en-US"/>
           </a:p>
@@ -2663,7 +2669,7 @@
           <a:p>
             <a:fld id="{F6FBCA6B-5BBD-4027-BE90-56FA1D5E4F5A}" type="datetimeFigureOut">
               <a:rPr lang="en-US" smtClean="0"/>
-              <a:t>3/29/2022</a:t>
+              <a:t>12/28/2023</a:t>
             </a:fld>
             <a:endParaRPr lang="en-US"/>
           </a:p>
@@ -2904,7 +2910,7 @@
           <a:p>
             <a:fld id="{F6FBCA6B-5BBD-4027-BE90-56FA1D5E4F5A}" type="datetimeFigureOut">
               <a:rPr lang="en-US" smtClean="0"/>
-              <a:t>3/29/2022</a:t>
+              <a:t>12/28/2023</a:t>
             </a:fld>
             <a:endParaRPr lang="en-US"/>
           </a:p>
@@ -5036,6 +5042,985 @@
 </p:sld>
 </file>
 
+<file path=ppt/slides/slide2.xml><?xml version="1.0" encoding="utf-8"?>
+<p:sld xmlns:a="http://schemas.openxmlformats.org/drawingml/2006/main" xmlns:r="http://schemas.openxmlformats.org/officeDocument/2006/relationships" xmlns:p="http://schemas.openxmlformats.org/presentationml/2006/main">
+  <p:cSld>
+    <p:spTree>
+      <p:nvGrpSpPr>
+        <p:cNvPr id="1" name=""/>
+        <p:cNvGrpSpPr/>
+        <p:nvPr/>
+      </p:nvGrpSpPr>
+      <p:grpSpPr>
+        <a:xfrm>
+          <a:off x="0" y="0"/>
+          <a:ext cx="0" cy="0"/>
+          <a:chOff x="0" y="0"/>
+          <a:chExt cx="0" cy="0"/>
+        </a:xfrm>
+      </p:grpSpPr>
+      <p:sp>
+        <p:nvSpPr>
+          <p:cNvPr id="20" name="Freeform: Shape 19">
+            <a:extLst>
+              <a:ext uri="{FF2B5EF4-FFF2-40B4-BE49-F238E27FC236}">
+                <a16:creationId xmlns:a16="http://schemas.microsoft.com/office/drawing/2014/main" id="{55B81CFF-98B8-F01C-6828-EFCE3A40A848}"/>
+              </a:ext>
+            </a:extLst>
+          </p:cNvPr>
+          <p:cNvSpPr/>
+          <p:nvPr/>
+        </p:nvSpPr>
+        <p:spPr>
+          <a:xfrm>
+            <a:off x="316523" y="2694842"/>
+            <a:ext cx="8387862" cy="663863"/>
+          </a:xfrm>
+          <a:custGeom>
+            <a:avLst/>
+            <a:gdLst>
+              <a:gd name="connsiteX0" fmla="*/ 0 w 8387862"/>
+              <a:gd name="connsiteY0" fmla="*/ 413239 h 663863"/>
+              <a:gd name="connsiteX1" fmla="*/ 1437542 w 8387862"/>
+              <a:gd name="connsiteY1" fmla="*/ 175846 h 663863"/>
+              <a:gd name="connsiteX2" fmla="*/ 3429000 w 8387862"/>
+              <a:gd name="connsiteY2" fmla="*/ 663820 h 663863"/>
+              <a:gd name="connsiteX3" fmla="*/ 4980842 w 8387862"/>
+              <a:gd name="connsiteY3" fmla="*/ 145073 h 663863"/>
+              <a:gd name="connsiteX4" fmla="*/ 6853604 w 8387862"/>
+              <a:gd name="connsiteY4" fmla="*/ 487973 h 663863"/>
+              <a:gd name="connsiteX5" fmla="*/ 8387862 w 8387862"/>
+              <a:gd name="connsiteY5" fmla="*/ 0 h 663863"/>
+            </a:gdLst>
+            <a:ahLst/>
+            <a:cxnLst>
+              <a:cxn ang="0">
+                <a:pos x="connsiteX0" y="connsiteY0"/>
+              </a:cxn>
+              <a:cxn ang="0">
+                <a:pos x="connsiteX1" y="connsiteY1"/>
+              </a:cxn>
+              <a:cxn ang="0">
+                <a:pos x="connsiteX2" y="connsiteY2"/>
+              </a:cxn>
+              <a:cxn ang="0">
+                <a:pos x="connsiteX3" y="connsiteY3"/>
+              </a:cxn>
+              <a:cxn ang="0">
+                <a:pos x="connsiteX4" y="connsiteY4"/>
+              </a:cxn>
+              <a:cxn ang="0">
+                <a:pos x="connsiteX5" y="connsiteY5"/>
+              </a:cxn>
+            </a:cxnLst>
+            <a:rect l="l" t="t" r="r" b="b"/>
+            <a:pathLst>
+              <a:path w="8387862" h="663863">
+                <a:moveTo>
+                  <a:pt x="0" y="413239"/>
+                </a:moveTo>
+                <a:cubicBezTo>
+                  <a:pt x="433021" y="273661"/>
+                  <a:pt x="866042" y="134083"/>
+                  <a:pt x="1437542" y="175846"/>
+                </a:cubicBezTo>
+                <a:cubicBezTo>
+                  <a:pt x="2009042" y="217609"/>
+                  <a:pt x="2838450" y="668949"/>
+                  <a:pt x="3429000" y="663820"/>
+                </a:cubicBezTo>
+                <a:cubicBezTo>
+                  <a:pt x="4019550" y="658691"/>
+                  <a:pt x="4410075" y="174381"/>
+                  <a:pt x="4980842" y="145073"/>
+                </a:cubicBezTo>
+                <a:cubicBezTo>
+                  <a:pt x="5551609" y="115765"/>
+                  <a:pt x="6285767" y="512152"/>
+                  <a:pt x="6853604" y="487973"/>
+                </a:cubicBezTo>
+                <a:cubicBezTo>
+                  <a:pt x="7421441" y="463794"/>
+                  <a:pt x="7904651" y="231897"/>
+                  <a:pt x="8387862" y="0"/>
+                </a:cubicBezTo>
+              </a:path>
+            </a:pathLst>
+          </a:custGeom>
+          <a:noFill/>
+          <a:ln w="317500">
+            <a:solidFill>
+              <a:schemeClr val="bg1">
+                <a:lumMod val="85000"/>
+                <a:alpha val="90000"/>
+              </a:schemeClr>
+            </a:solidFill>
+          </a:ln>
+        </p:spPr>
+        <p:style>
+          <a:lnRef idx="2">
+            <a:schemeClr val="accent1">
+              <a:shade val="15000"/>
+            </a:schemeClr>
+          </a:lnRef>
+          <a:fillRef idx="1">
+            <a:schemeClr val="accent1"/>
+          </a:fillRef>
+          <a:effectRef idx="0">
+            <a:schemeClr val="accent1"/>
+          </a:effectRef>
+          <a:fontRef idx="minor">
+            <a:schemeClr val="lt1"/>
+          </a:fontRef>
+        </p:style>
+        <p:txBody>
+          <a:bodyPr rtlCol="0" anchor="ctr"/>
+          <a:lstStyle/>
+          <a:p>
+            <a:pPr algn="ctr"/>
+            <a:endParaRPr lang="en-US"/>
+          </a:p>
+        </p:txBody>
+      </p:sp>
+      <p:sp>
+        <p:nvSpPr>
+          <p:cNvPr id="4" name="Speech Bubble: Rectangle 3">
+            <a:extLst>
+              <a:ext uri="{FF2B5EF4-FFF2-40B4-BE49-F238E27FC236}">
+                <a16:creationId xmlns:a16="http://schemas.microsoft.com/office/drawing/2014/main" id="{1AD095B9-7925-E8C7-2548-28DC5144F7AD}"/>
+              </a:ext>
+            </a:extLst>
+          </p:cNvPr>
+          <p:cNvSpPr/>
+          <p:nvPr/>
+        </p:nvSpPr>
+        <p:spPr>
+          <a:xfrm>
+            <a:off x="397823" y="559326"/>
+            <a:ext cx="2470067" cy="1376352"/>
+          </a:xfrm>
+          <a:prstGeom prst="wedgeRectCallout">
+            <a:avLst>
+              <a:gd name="adj1" fmla="val -29198"/>
+              <a:gd name="adj2" fmla="val 84540"/>
+            </a:avLst>
+          </a:prstGeom>
+          <a:effectLst>
+            <a:outerShdw blurRad="50800" dist="38100" dir="2700000" algn="tl" rotWithShape="0">
+              <a:prstClr val="black">
+                <a:alpha val="40000"/>
+              </a:prstClr>
+            </a:outerShdw>
+          </a:effectLst>
+        </p:spPr>
+        <p:style>
+          <a:lnRef idx="1">
+            <a:schemeClr val="accent6"/>
+          </a:lnRef>
+          <a:fillRef idx="2">
+            <a:schemeClr val="accent6"/>
+          </a:fillRef>
+          <a:effectRef idx="1">
+            <a:schemeClr val="accent6"/>
+          </a:effectRef>
+          <a:fontRef idx="minor">
+            <a:schemeClr val="dk1"/>
+          </a:fontRef>
+        </p:style>
+        <p:txBody>
+          <a:bodyPr rtlCol="0" anchor="ctr"/>
+          <a:lstStyle/>
+          <a:p>
+            <a:pPr algn="ctr"/>
+            <a:r>
+              <a:rPr lang="en-US" sz="1000" b="1" dirty="0">
+                <a:solidFill>
+                  <a:schemeClr val="accent6">
+                    <a:lumMod val="50000"/>
+                  </a:schemeClr>
+                </a:solidFill>
+              </a:rPr>
+              <a:t>Introduction to Azure Database for PostgreSQL</a:t>
+            </a:r>
+          </a:p>
+          <a:p>
+            <a:pPr algn="ctr"/>
+            <a:endParaRPr lang="en-US" sz="1000" dirty="0">
+              <a:solidFill>
+                <a:schemeClr val="accent6">
+                  <a:lumMod val="50000"/>
+                </a:schemeClr>
+              </a:solidFill>
+            </a:endParaRPr>
+          </a:p>
+          <a:p>
+            <a:pPr algn="ctr"/>
+            <a:r>
+              <a:rPr lang="en-US" sz="1000" b="1" dirty="0">
+                <a:solidFill>
+                  <a:schemeClr val="accent6">
+                    <a:lumMod val="75000"/>
+                  </a:schemeClr>
+                </a:solidFill>
+              </a:rPr>
+              <a:t>(Learn basics of </a:t>
+            </a:r>
+            <a:r>
+              <a:rPr lang="en-US" sz="1000" b="1" dirty="0" err="1">
+                <a:solidFill>
+                  <a:schemeClr val="accent6">
+                    <a:lumMod val="75000"/>
+                  </a:schemeClr>
+                </a:solidFill>
+              </a:rPr>
+              <a:t>PostgresQL</a:t>
+            </a:r>
+            <a:r>
+              <a:rPr lang="en-US" sz="1000" b="1" dirty="0">
+                <a:solidFill>
+                  <a:schemeClr val="accent6">
+                    <a:lumMod val="75000"/>
+                  </a:schemeClr>
+                </a:solidFill>
+              </a:rPr>
+              <a:t>, Azure Fundamentals and Azure database for PostgreSQL – key features and concepts.)</a:t>
+            </a:r>
+          </a:p>
+        </p:txBody>
+      </p:sp>
+      <p:pic>
+        <p:nvPicPr>
+          <p:cNvPr id="6" name="Graphic 5" descr="Marker with solid fill">
+            <a:extLst>
+              <a:ext uri="{FF2B5EF4-FFF2-40B4-BE49-F238E27FC236}">
+                <a16:creationId xmlns:a16="http://schemas.microsoft.com/office/drawing/2014/main" id="{D3132CED-F244-E70C-E87A-65C8031FCCD9}"/>
+              </a:ext>
+            </a:extLst>
+          </p:cNvPr>
+          <p:cNvPicPr>
+            <a:picLocks noChangeAspect="1"/>
+          </p:cNvPicPr>
+          <p:nvPr/>
+        </p:nvPicPr>
+        <p:blipFill>
+          <a:blip r:embed="rId2">
+            <a:extLst>
+              <a:ext uri="{28A0092B-C50C-407E-A947-70E740481C1C}">
+                <a14:useLocalDpi xmlns:a14="http://schemas.microsoft.com/office/drawing/2010/main" val="0"/>
+              </a:ext>
+              <a:ext uri="{96DAC541-7B7A-43D3-8B79-37D633B846F1}">
+                <asvg:svgBlip xmlns:asvg="http://schemas.microsoft.com/office/drawing/2016/SVG/main" r:embed="rId3"/>
+              </a:ext>
+            </a:extLst>
+          </a:blip>
+          <a:stretch>
+            <a:fillRect/>
+          </a:stretch>
+        </p:blipFill>
+        <p:spPr>
+          <a:xfrm>
+            <a:off x="585652" y="2363385"/>
+            <a:ext cx="622267" cy="622267"/>
+          </a:xfrm>
+          <a:prstGeom prst="rect">
+            <a:avLst/>
+          </a:prstGeom>
+        </p:spPr>
+      </p:pic>
+      <p:sp>
+        <p:nvSpPr>
+          <p:cNvPr id="7" name="TextBox 6">
+            <a:extLst>
+              <a:ext uri="{FF2B5EF4-FFF2-40B4-BE49-F238E27FC236}">
+                <a16:creationId xmlns:a16="http://schemas.microsoft.com/office/drawing/2014/main" id="{A9C300E7-09D1-E2EB-0363-45A47CAE6702}"/>
+              </a:ext>
+            </a:extLst>
+          </p:cNvPr>
+          <p:cNvSpPr txBox="1"/>
+          <p:nvPr/>
+        </p:nvSpPr>
+        <p:spPr>
+          <a:xfrm>
+            <a:off x="1911730" y="1935678"/>
+            <a:ext cx="956160" cy="246221"/>
+          </a:xfrm>
+          <a:prstGeom prst="rect">
+            <a:avLst/>
+          </a:prstGeom>
+          <a:noFill/>
+        </p:spPr>
+        <p:txBody>
+          <a:bodyPr wrap="square" rtlCol="0">
+            <a:spAutoFit/>
+          </a:bodyPr>
+          <a:lstStyle/>
+          <a:p>
+            <a:pPr algn="r"/>
+            <a:r>
+              <a:rPr lang="en-US" sz="1000" b="1" dirty="0">
+                <a:solidFill>
+                  <a:schemeClr val="accent6">
+                    <a:lumMod val="50000"/>
+                  </a:schemeClr>
+                </a:solidFill>
+              </a:rPr>
+              <a:t>Chapters 1 &amp; 2</a:t>
+            </a:r>
+          </a:p>
+        </p:txBody>
+      </p:sp>
+      <p:sp>
+        <p:nvSpPr>
+          <p:cNvPr id="8" name="Speech Bubble: Rectangle 7">
+            <a:extLst>
+              <a:ext uri="{FF2B5EF4-FFF2-40B4-BE49-F238E27FC236}">
+                <a16:creationId xmlns:a16="http://schemas.microsoft.com/office/drawing/2014/main" id="{DB8508AB-8D53-D5BB-D8E2-49CFC3541530}"/>
+              </a:ext>
+            </a:extLst>
+          </p:cNvPr>
+          <p:cNvSpPr/>
+          <p:nvPr/>
+        </p:nvSpPr>
+        <p:spPr>
+          <a:xfrm>
+            <a:off x="3371504" y="559326"/>
+            <a:ext cx="2470067" cy="1376352"/>
+          </a:xfrm>
+          <a:prstGeom prst="wedgeRectCallout">
+            <a:avLst>
+              <a:gd name="adj1" fmla="val -722"/>
+              <a:gd name="adj2" fmla="val 91247"/>
+            </a:avLst>
+          </a:prstGeom>
+        </p:spPr>
+        <p:style>
+          <a:lnRef idx="1">
+            <a:schemeClr val="accent4"/>
+          </a:lnRef>
+          <a:fillRef idx="2">
+            <a:schemeClr val="accent4"/>
+          </a:fillRef>
+          <a:effectRef idx="1">
+            <a:schemeClr val="accent4"/>
+          </a:effectRef>
+          <a:fontRef idx="minor">
+            <a:schemeClr val="dk1"/>
+          </a:fontRef>
+        </p:style>
+        <p:txBody>
+          <a:bodyPr rtlCol="0" anchor="ctr"/>
+          <a:lstStyle/>
+          <a:p>
+            <a:pPr algn="ctr"/>
+            <a:r>
+              <a:rPr lang="en-US" sz="1000" b="1" dirty="0">
+                <a:solidFill>
+                  <a:schemeClr val="accent4">
+                    <a:lumMod val="50000"/>
+                  </a:schemeClr>
+                </a:solidFill>
+              </a:rPr>
+              <a:t>End to End Application Development with Azure Database for PostgreSQL</a:t>
+            </a:r>
+          </a:p>
+          <a:p>
+            <a:pPr algn="ctr"/>
+            <a:endParaRPr lang="en-US" sz="1000" dirty="0">
+              <a:solidFill>
+                <a:schemeClr val="accent6">
+                  <a:lumMod val="50000"/>
+                </a:schemeClr>
+              </a:solidFill>
+            </a:endParaRPr>
+          </a:p>
+          <a:p>
+            <a:pPr algn="ctr"/>
+            <a:r>
+              <a:rPr lang="en-US" sz="1000" b="1" dirty="0">
+                <a:solidFill>
+                  <a:schemeClr val="accent4">
+                    <a:lumMod val="75000"/>
+                  </a:schemeClr>
+                </a:solidFill>
+              </a:rPr>
+              <a:t>(Choose the right hosting option for your PostgreSQL application on Azure and learn how to deploy your app integrating with these Azure services, through a tutorial.)</a:t>
+            </a:r>
+          </a:p>
+        </p:txBody>
+      </p:sp>
+      <p:sp>
+        <p:nvSpPr>
+          <p:cNvPr id="9" name="TextBox 8">
+            <a:extLst>
+              <a:ext uri="{FF2B5EF4-FFF2-40B4-BE49-F238E27FC236}">
+                <a16:creationId xmlns:a16="http://schemas.microsoft.com/office/drawing/2014/main" id="{25839552-C088-937F-6BC4-C49FC316F30D}"/>
+              </a:ext>
+            </a:extLst>
+          </p:cNvPr>
+          <p:cNvSpPr txBox="1"/>
+          <p:nvPr/>
+        </p:nvSpPr>
+        <p:spPr>
+          <a:xfrm>
+            <a:off x="5132813" y="1935678"/>
+            <a:ext cx="708758" cy="246221"/>
+          </a:xfrm>
+          <a:prstGeom prst="rect">
+            <a:avLst/>
+          </a:prstGeom>
+          <a:noFill/>
+        </p:spPr>
+        <p:txBody>
+          <a:bodyPr wrap="square" rtlCol="0">
+            <a:spAutoFit/>
+          </a:bodyPr>
+          <a:lstStyle/>
+          <a:p>
+            <a:pPr algn="r"/>
+            <a:r>
+              <a:rPr lang="en-US" sz="1000" b="1" dirty="0">
+                <a:solidFill>
+                  <a:schemeClr val="accent4">
+                    <a:lumMod val="50000"/>
+                  </a:schemeClr>
+                </a:solidFill>
+              </a:rPr>
+              <a:t>Chapter 4</a:t>
+            </a:r>
+          </a:p>
+        </p:txBody>
+      </p:sp>
+      <p:pic>
+        <p:nvPicPr>
+          <p:cNvPr id="10" name="Graphic 9" descr="Marker with solid fill">
+            <a:extLst>
+              <a:ext uri="{FF2B5EF4-FFF2-40B4-BE49-F238E27FC236}">
+                <a16:creationId xmlns:a16="http://schemas.microsoft.com/office/drawing/2014/main" id="{62436298-A332-0E72-8BE1-E3A559D724C2}"/>
+              </a:ext>
+            </a:extLst>
+          </p:cNvPr>
+          <p:cNvPicPr>
+            <a:picLocks noChangeAspect="1"/>
+          </p:cNvPicPr>
+          <p:nvPr/>
+        </p:nvPicPr>
+        <p:blipFill>
+          <a:blip r:embed="rId4">
+            <a:extLst>
+              <a:ext uri="{28A0092B-C50C-407E-A947-70E740481C1C}">
+                <a14:useLocalDpi xmlns:a14="http://schemas.microsoft.com/office/drawing/2010/main" val="0"/>
+              </a:ext>
+              <a:ext uri="{96DAC541-7B7A-43D3-8B79-37D633B846F1}">
+                <asvg:svgBlip xmlns:asvg="http://schemas.microsoft.com/office/drawing/2016/SVG/main" r:embed="rId5"/>
+              </a:ext>
+            </a:extLst>
+          </a:blip>
+          <a:stretch>
+            <a:fillRect/>
+          </a:stretch>
+        </p:blipFill>
+        <p:spPr>
+          <a:xfrm>
+            <a:off x="4341584" y="2448621"/>
+            <a:ext cx="622267" cy="622267"/>
+          </a:xfrm>
+          <a:prstGeom prst="rect">
+            <a:avLst/>
+          </a:prstGeom>
+        </p:spPr>
+      </p:pic>
+      <p:sp>
+        <p:nvSpPr>
+          <p:cNvPr id="11" name="Speech Bubble: Rectangle 10">
+            <a:extLst>
+              <a:ext uri="{FF2B5EF4-FFF2-40B4-BE49-F238E27FC236}">
+                <a16:creationId xmlns:a16="http://schemas.microsoft.com/office/drawing/2014/main" id="{60EB69E3-06A4-69DA-15AE-EECC3A5B4711}"/>
+              </a:ext>
+            </a:extLst>
+          </p:cNvPr>
+          <p:cNvSpPr/>
+          <p:nvPr/>
+        </p:nvSpPr>
+        <p:spPr>
+          <a:xfrm>
+            <a:off x="6271062" y="559326"/>
+            <a:ext cx="2470067" cy="1376352"/>
+          </a:xfrm>
+          <a:prstGeom prst="wedgeRectCallout">
+            <a:avLst>
+              <a:gd name="adj1" fmla="val 28111"/>
+              <a:gd name="adj2" fmla="val 81345"/>
+            </a:avLst>
+          </a:prstGeom>
+        </p:spPr>
+        <p:style>
+          <a:lnRef idx="1">
+            <a:schemeClr val="accent3"/>
+          </a:lnRef>
+          <a:fillRef idx="2">
+            <a:schemeClr val="accent3"/>
+          </a:fillRef>
+          <a:effectRef idx="1">
+            <a:schemeClr val="accent3"/>
+          </a:effectRef>
+          <a:fontRef idx="minor">
+            <a:schemeClr val="dk1"/>
+          </a:fontRef>
+        </p:style>
+        <p:txBody>
+          <a:bodyPr rtlCol="0" anchor="ctr"/>
+          <a:lstStyle/>
+          <a:p>
+            <a:pPr algn="ctr"/>
+            <a:r>
+              <a:rPr lang="en-US" sz="1000" b="1" dirty="0">
+                <a:solidFill>
+                  <a:schemeClr val="bg2">
+                    <a:lumMod val="10000"/>
+                  </a:schemeClr>
+                </a:solidFill>
+              </a:rPr>
+              <a:t>Azure Database for PostgreSQL architectures and customer stories</a:t>
+            </a:r>
+          </a:p>
+          <a:p>
+            <a:pPr algn="ctr"/>
+            <a:endParaRPr lang="en-US" sz="1000" dirty="0">
+              <a:solidFill>
+                <a:schemeClr val="accent6">
+                  <a:lumMod val="50000"/>
+                </a:schemeClr>
+              </a:solidFill>
+            </a:endParaRPr>
+          </a:p>
+          <a:p>
+            <a:pPr algn="ctr"/>
+            <a:r>
+              <a:rPr lang="en-US" sz="1000" b="1" dirty="0">
+                <a:solidFill>
+                  <a:schemeClr val="bg2">
+                    <a:lumMod val="50000"/>
+                  </a:schemeClr>
+                </a:solidFill>
+              </a:rPr>
+              <a:t>(Explore ways to architect your PostgreSQL applications by learning from sample reference architectures and our customer success stories.)</a:t>
+            </a:r>
+          </a:p>
+        </p:txBody>
+      </p:sp>
+      <p:sp>
+        <p:nvSpPr>
+          <p:cNvPr id="12" name="TextBox 11">
+            <a:extLst>
+              <a:ext uri="{FF2B5EF4-FFF2-40B4-BE49-F238E27FC236}">
+                <a16:creationId xmlns:a16="http://schemas.microsoft.com/office/drawing/2014/main" id="{ABBAEB50-4843-E420-40CF-D40FCA8D1CF7}"/>
+              </a:ext>
+            </a:extLst>
+          </p:cNvPr>
+          <p:cNvSpPr txBox="1"/>
+          <p:nvPr/>
+        </p:nvSpPr>
+        <p:spPr>
+          <a:xfrm>
+            <a:off x="6522983" y="1952843"/>
+            <a:ext cx="1299259" cy="246221"/>
+          </a:xfrm>
+          <a:prstGeom prst="rect">
+            <a:avLst/>
+          </a:prstGeom>
+          <a:noFill/>
+        </p:spPr>
+        <p:txBody>
+          <a:bodyPr wrap="square" rtlCol="0">
+            <a:spAutoFit/>
+          </a:bodyPr>
+          <a:lstStyle/>
+          <a:p>
+            <a:pPr algn="r"/>
+            <a:r>
+              <a:rPr lang="en-US" sz="1000" b="1" dirty="0">
+                <a:solidFill>
+                  <a:schemeClr val="bg2">
+                    <a:lumMod val="10000"/>
+                  </a:schemeClr>
+                </a:solidFill>
+              </a:rPr>
+              <a:t>Chapters 12 &amp; 13</a:t>
+            </a:r>
+          </a:p>
+        </p:txBody>
+      </p:sp>
+      <p:pic>
+        <p:nvPicPr>
+          <p:cNvPr id="13" name="Graphic 12" descr="Marker with solid fill">
+            <a:extLst>
+              <a:ext uri="{FF2B5EF4-FFF2-40B4-BE49-F238E27FC236}">
+                <a16:creationId xmlns:a16="http://schemas.microsoft.com/office/drawing/2014/main" id="{E301DE23-129B-7497-8425-927F0E45C0E5}"/>
+              </a:ext>
+            </a:extLst>
+          </p:cNvPr>
+          <p:cNvPicPr>
+            <a:picLocks noChangeAspect="1"/>
+          </p:cNvPicPr>
+          <p:nvPr/>
+        </p:nvPicPr>
+        <p:blipFill>
+          <a:blip r:embed="rId6">
+            <a:extLst>
+              <a:ext uri="{28A0092B-C50C-407E-A947-70E740481C1C}">
+                <a14:useLocalDpi xmlns:a14="http://schemas.microsoft.com/office/drawing/2010/main" val="0"/>
+              </a:ext>
+              <a:ext uri="{96DAC541-7B7A-43D3-8B79-37D633B846F1}">
+                <asvg:svgBlip xmlns:asvg="http://schemas.microsoft.com/office/drawing/2016/SVG/main" r:embed="rId7"/>
+              </a:ext>
+            </a:extLst>
+          </a:blip>
+          <a:stretch>
+            <a:fillRect/>
+          </a:stretch>
+        </p:blipFill>
+        <p:spPr>
+          <a:xfrm>
+            <a:off x="7889562" y="2318796"/>
+            <a:ext cx="622267" cy="622267"/>
+          </a:xfrm>
+          <a:prstGeom prst="rect">
+            <a:avLst/>
+          </a:prstGeom>
+        </p:spPr>
+      </p:pic>
+      <p:sp>
+        <p:nvSpPr>
+          <p:cNvPr id="14" name="Speech Bubble: Rectangle 13">
+            <a:extLst>
+              <a:ext uri="{FF2B5EF4-FFF2-40B4-BE49-F238E27FC236}">
+                <a16:creationId xmlns:a16="http://schemas.microsoft.com/office/drawing/2014/main" id="{16962046-2D10-8AD2-2D5E-3DF81320F3BC}"/>
+              </a:ext>
+            </a:extLst>
+          </p:cNvPr>
+          <p:cNvSpPr/>
+          <p:nvPr/>
+        </p:nvSpPr>
+        <p:spPr>
+          <a:xfrm>
+            <a:off x="825754" y="3871648"/>
+            <a:ext cx="2470067" cy="1376352"/>
+          </a:xfrm>
+          <a:prstGeom prst="wedgeRectCallout">
+            <a:avLst>
+              <a:gd name="adj1" fmla="val 27274"/>
+              <a:gd name="adj2" fmla="val -96312"/>
+            </a:avLst>
+          </a:prstGeom>
+        </p:spPr>
+        <p:style>
+          <a:lnRef idx="1">
+            <a:schemeClr val="accent5"/>
+          </a:lnRef>
+          <a:fillRef idx="2">
+            <a:schemeClr val="accent5"/>
+          </a:fillRef>
+          <a:effectRef idx="1">
+            <a:schemeClr val="accent5"/>
+          </a:effectRef>
+          <a:fontRef idx="minor">
+            <a:schemeClr val="dk1"/>
+          </a:fontRef>
+        </p:style>
+        <p:txBody>
+          <a:bodyPr rtlCol="0" anchor="ctr"/>
+          <a:lstStyle/>
+          <a:p>
+            <a:pPr algn="ctr"/>
+            <a:r>
+              <a:rPr lang="en-US" sz="1000" b="1" dirty="0">
+                <a:solidFill>
+                  <a:schemeClr val="accent1">
+                    <a:lumMod val="50000"/>
+                  </a:schemeClr>
+                </a:solidFill>
+              </a:rPr>
+              <a:t>Getting Started with Azure Database for PostgreSQL</a:t>
+            </a:r>
+          </a:p>
+          <a:p>
+            <a:pPr algn="ctr"/>
+            <a:endParaRPr lang="en-US" sz="1000" dirty="0">
+              <a:solidFill>
+                <a:schemeClr val="accent6">
+                  <a:lumMod val="50000"/>
+                </a:schemeClr>
+              </a:solidFill>
+            </a:endParaRPr>
+          </a:p>
+          <a:p>
+            <a:pPr algn="ctr"/>
+            <a:r>
+              <a:rPr lang="en-US" sz="1000" b="1" dirty="0">
+                <a:solidFill>
+                  <a:schemeClr val="accent1">
+                    <a:lumMod val="75000"/>
+                  </a:schemeClr>
+                </a:solidFill>
+              </a:rPr>
+              <a:t>(Set up your environment, learn how to provision, connect to and query Azure Database for PostgreSQL.)</a:t>
+            </a:r>
+          </a:p>
+        </p:txBody>
+      </p:sp>
+      <p:sp>
+        <p:nvSpPr>
+          <p:cNvPr id="15" name="Speech Bubble: Rectangle 14">
+            <a:extLst>
+              <a:ext uri="{FF2B5EF4-FFF2-40B4-BE49-F238E27FC236}">
+                <a16:creationId xmlns:a16="http://schemas.microsoft.com/office/drawing/2014/main" id="{FA8DBBD7-10E1-8FDD-5C97-7006F66B8D49}"/>
+              </a:ext>
+            </a:extLst>
+          </p:cNvPr>
+          <p:cNvSpPr/>
+          <p:nvPr/>
+        </p:nvSpPr>
+        <p:spPr>
+          <a:xfrm>
+            <a:off x="5419495" y="3871648"/>
+            <a:ext cx="2470067" cy="1376352"/>
+          </a:xfrm>
+          <a:prstGeom prst="wedgeRectCallout">
+            <a:avLst>
+              <a:gd name="adj1" fmla="val -4940"/>
+              <a:gd name="adj2" fmla="val -102061"/>
+            </a:avLst>
+          </a:prstGeom>
+        </p:spPr>
+        <p:style>
+          <a:lnRef idx="1">
+            <a:schemeClr val="accent2"/>
+          </a:lnRef>
+          <a:fillRef idx="2">
+            <a:schemeClr val="accent2"/>
+          </a:fillRef>
+          <a:effectRef idx="1">
+            <a:schemeClr val="accent2"/>
+          </a:effectRef>
+          <a:fontRef idx="minor">
+            <a:schemeClr val="dk1"/>
+          </a:fontRef>
+        </p:style>
+        <p:txBody>
+          <a:bodyPr rtlCol="0" anchor="ctr"/>
+          <a:lstStyle/>
+          <a:p>
+            <a:pPr algn="ctr"/>
+            <a:r>
+              <a:rPr lang="en-US" sz="1000" b="1" dirty="0">
+                <a:solidFill>
+                  <a:schemeClr val="accent2">
+                    <a:lumMod val="50000"/>
+                  </a:schemeClr>
+                </a:solidFill>
+              </a:rPr>
+              <a:t>Application + Database – Best Practices and Troubleshooting</a:t>
+            </a:r>
+          </a:p>
+          <a:p>
+            <a:pPr algn="ctr"/>
+            <a:endParaRPr lang="en-US" sz="1000" dirty="0">
+              <a:solidFill>
+                <a:schemeClr val="accent6">
+                  <a:lumMod val="50000"/>
+                </a:schemeClr>
+              </a:solidFill>
+            </a:endParaRPr>
+          </a:p>
+          <a:p>
+            <a:pPr algn="ctr"/>
+            <a:r>
+              <a:rPr lang="en-US" sz="1000" b="1" dirty="0">
+                <a:solidFill>
+                  <a:schemeClr val="accent2">
+                    <a:lumMod val="75000"/>
+                  </a:schemeClr>
+                </a:solidFill>
+              </a:rPr>
+              <a:t>(Learn tips and tricks to build efficient, stable applications: Monitoring, Networking &amp; Security, Testing, Performance, Troubleshooting, BCDR.)</a:t>
+            </a:r>
+          </a:p>
+        </p:txBody>
+      </p:sp>
+      <p:pic>
+        <p:nvPicPr>
+          <p:cNvPr id="16" name="Graphic 15" descr="Marker with solid fill">
+            <a:extLst>
+              <a:ext uri="{FF2B5EF4-FFF2-40B4-BE49-F238E27FC236}">
+                <a16:creationId xmlns:a16="http://schemas.microsoft.com/office/drawing/2014/main" id="{311D5612-6915-1867-9266-A0C2314DCD43}"/>
+              </a:ext>
+            </a:extLst>
+          </p:cNvPr>
+          <p:cNvPicPr>
+            <a:picLocks noChangeAspect="1"/>
+          </p:cNvPicPr>
+          <p:nvPr/>
+        </p:nvPicPr>
+        <p:blipFill>
+          <a:blip r:embed="rId8">
+            <a:extLst>
+              <a:ext uri="{28A0092B-C50C-407E-A947-70E740481C1C}">
+                <a14:useLocalDpi xmlns:a14="http://schemas.microsoft.com/office/drawing/2010/main" val="0"/>
+              </a:ext>
+              <a:ext uri="{96DAC541-7B7A-43D3-8B79-37D633B846F1}">
+                <asvg:svgBlip xmlns:asvg="http://schemas.microsoft.com/office/drawing/2016/SVG/main" r:embed="rId9"/>
+              </a:ext>
+            </a:extLst>
+          </a:blip>
+          <a:stretch>
+            <a:fillRect/>
+          </a:stretch>
+        </p:blipFill>
+        <p:spPr>
+          <a:xfrm>
+            <a:off x="2429654" y="2660701"/>
+            <a:ext cx="622267" cy="622267"/>
+          </a:xfrm>
+          <a:prstGeom prst="rect">
+            <a:avLst/>
+          </a:prstGeom>
+        </p:spPr>
+      </p:pic>
+      <p:pic>
+        <p:nvPicPr>
+          <p:cNvPr id="17" name="Graphic 16" descr="Marker with solid fill">
+            <a:extLst>
+              <a:ext uri="{FF2B5EF4-FFF2-40B4-BE49-F238E27FC236}">
+                <a16:creationId xmlns:a16="http://schemas.microsoft.com/office/drawing/2014/main" id="{1874FBA5-B018-7665-98F1-DF2452D2C8AF}"/>
+              </a:ext>
+            </a:extLst>
+          </p:cNvPr>
+          <p:cNvPicPr>
+            <a:picLocks noChangeAspect="1"/>
+          </p:cNvPicPr>
+          <p:nvPr/>
+        </p:nvPicPr>
+        <p:blipFill>
+          <a:blip r:embed="rId10">
+            <a:extLst>
+              <a:ext uri="{28A0092B-C50C-407E-A947-70E740481C1C}">
+                <a14:useLocalDpi xmlns:a14="http://schemas.microsoft.com/office/drawing/2010/main" val="0"/>
+              </a:ext>
+              <a:ext uri="{96DAC541-7B7A-43D3-8B79-37D633B846F1}">
+                <asvg:svgBlip xmlns:asvg="http://schemas.microsoft.com/office/drawing/2016/SVG/main" r:embed="rId11"/>
+              </a:ext>
+            </a:extLst>
+          </a:blip>
+          <a:stretch>
+            <a:fillRect/>
+          </a:stretch>
+        </p:blipFill>
+        <p:spPr>
+          <a:xfrm>
+            <a:off x="6235020" y="2596253"/>
+            <a:ext cx="622267" cy="622267"/>
+          </a:xfrm>
+          <a:prstGeom prst="rect">
+            <a:avLst/>
+          </a:prstGeom>
+        </p:spPr>
+      </p:pic>
+      <p:sp>
+        <p:nvSpPr>
+          <p:cNvPr id="21" name="TextBox 20">
+            <a:extLst>
+              <a:ext uri="{FF2B5EF4-FFF2-40B4-BE49-F238E27FC236}">
+                <a16:creationId xmlns:a16="http://schemas.microsoft.com/office/drawing/2014/main" id="{043A47E8-F8FD-2595-DC79-5837C1FF632E}"/>
+              </a:ext>
+            </a:extLst>
+          </p:cNvPr>
+          <p:cNvSpPr txBox="1"/>
+          <p:nvPr/>
+        </p:nvSpPr>
+        <p:spPr>
+          <a:xfrm>
+            <a:off x="761528" y="3631151"/>
+            <a:ext cx="1299259" cy="246221"/>
+          </a:xfrm>
+          <a:prstGeom prst="rect">
+            <a:avLst/>
+          </a:prstGeom>
+          <a:noFill/>
+        </p:spPr>
+        <p:txBody>
+          <a:bodyPr wrap="square" rtlCol="0">
+            <a:spAutoFit/>
+          </a:bodyPr>
+          <a:lstStyle/>
+          <a:p>
+            <a:r>
+              <a:rPr lang="en-US" sz="1000" b="1" dirty="0">
+                <a:solidFill>
+                  <a:schemeClr val="accent1">
+                    <a:lumMod val="50000"/>
+                  </a:schemeClr>
+                </a:solidFill>
+              </a:rPr>
+              <a:t>Chapter 3</a:t>
+            </a:r>
+          </a:p>
+        </p:txBody>
+      </p:sp>
+      <p:sp>
+        <p:nvSpPr>
+          <p:cNvPr id="22" name="TextBox 21">
+            <a:extLst>
+              <a:ext uri="{FF2B5EF4-FFF2-40B4-BE49-F238E27FC236}">
+                <a16:creationId xmlns:a16="http://schemas.microsoft.com/office/drawing/2014/main" id="{033C1741-97F4-A74E-E0C5-D5C7864CDFF0}"/>
+              </a:ext>
+            </a:extLst>
+          </p:cNvPr>
+          <p:cNvSpPr txBox="1"/>
+          <p:nvPr/>
+        </p:nvSpPr>
+        <p:spPr>
+          <a:xfrm>
+            <a:off x="6654528" y="3631151"/>
+            <a:ext cx="1299259" cy="246221"/>
+          </a:xfrm>
+          <a:prstGeom prst="rect">
+            <a:avLst/>
+          </a:prstGeom>
+          <a:noFill/>
+        </p:spPr>
+        <p:txBody>
+          <a:bodyPr wrap="square" rtlCol="0">
+            <a:spAutoFit/>
+          </a:bodyPr>
+          <a:lstStyle/>
+          <a:p>
+            <a:pPr algn="r"/>
+            <a:r>
+              <a:rPr lang="en-US" sz="1000" b="1" dirty="0">
+                <a:solidFill>
+                  <a:schemeClr val="accent2">
+                    <a:lumMod val="50000"/>
+                  </a:schemeClr>
+                </a:solidFill>
+              </a:rPr>
+              <a:t>Chapters 5 to 11</a:t>
+            </a:r>
+          </a:p>
+        </p:txBody>
+      </p:sp>
+    </p:spTree>
+    <p:extLst>
+      <p:ext uri="{BB962C8B-B14F-4D97-AF65-F5344CB8AC3E}">
+        <p14:creationId xmlns:p14="http://schemas.microsoft.com/office/powerpoint/2010/main" val="1396241919"/>
+      </p:ext>
+    </p:extLst>
+  </p:cSld>
+  <p:clrMapOvr>
+    <a:masterClrMapping/>
+  </p:clrMapOvr>
+</p:sld>
+</file>
+
 <file path=ppt/theme/theme1.xml><?xml version="1.0" encoding="utf-8"?>
 <a:theme xmlns:a="http://schemas.openxmlformats.org/drawingml/2006/main" name="Office Theme">
   <a:themeElements>

</xml_diff>

<commit_message>
In progress - lab run-through
</commit_message>
<xml_diff>
--- a/resources/diagrams.pptx
+++ b/resources/diagrams.pptx
@@ -8,6 +8,7 @@
     <p:sldId id="257" r:id="rId2"/>
     <p:sldId id="256" r:id="rId3"/>
     <p:sldId id="258" r:id="rId4"/>
+    <p:sldId id="259" r:id="rId5"/>
   </p:sldIdLst>
   <p:sldSz cx="12192000" cy="6858000"/>
   <p:notesSz cx="6858000" cy="9144000"/>
@@ -261,7 +262,7 @@
           <a:p>
             <a:fld id="{F6FBCA6B-5BBD-4027-BE90-56FA1D5E4F5A}" type="datetimeFigureOut">
               <a:rPr lang="en-US" smtClean="0"/>
-              <a:t>12/28/2023</a:t>
+              <a:t>1/1/2024</a:t>
             </a:fld>
             <a:endParaRPr lang="en-US"/>
           </a:p>
@@ -459,7 +460,7 @@
           <a:p>
             <a:fld id="{F6FBCA6B-5BBD-4027-BE90-56FA1D5E4F5A}" type="datetimeFigureOut">
               <a:rPr lang="en-US" smtClean="0"/>
-              <a:t>12/28/2023</a:t>
+              <a:t>1/1/2024</a:t>
             </a:fld>
             <a:endParaRPr lang="en-US"/>
           </a:p>
@@ -667,7 +668,7 @@
           <a:p>
             <a:fld id="{F6FBCA6B-5BBD-4027-BE90-56FA1D5E4F5A}" type="datetimeFigureOut">
               <a:rPr lang="en-US" smtClean="0"/>
-              <a:t>12/28/2023</a:t>
+              <a:t>1/1/2024</a:t>
             </a:fld>
             <a:endParaRPr lang="en-US"/>
           </a:p>
@@ -865,7 +866,7 @@
           <a:p>
             <a:fld id="{F6FBCA6B-5BBD-4027-BE90-56FA1D5E4F5A}" type="datetimeFigureOut">
               <a:rPr lang="en-US" smtClean="0"/>
-              <a:t>12/28/2023</a:t>
+              <a:t>1/1/2024</a:t>
             </a:fld>
             <a:endParaRPr lang="en-US"/>
           </a:p>
@@ -1140,7 +1141,7 @@
           <a:p>
             <a:fld id="{F6FBCA6B-5BBD-4027-BE90-56FA1D5E4F5A}" type="datetimeFigureOut">
               <a:rPr lang="en-US" smtClean="0"/>
-              <a:t>12/28/2023</a:t>
+              <a:t>1/1/2024</a:t>
             </a:fld>
             <a:endParaRPr lang="en-US"/>
           </a:p>
@@ -1405,7 +1406,7 @@
           <a:p>
             <a:fld id="{F6FBCA6B-5BBD-4027-BE90-56FA1D5E4F5A}" type="datetimeFigureOut">
               <a:rPr lang="en-US" smtClean="0"/>
-              <a:t>12/28/2023</a:t>
+              <a:t>1/1/2024</a:t>
             </a:fld>
             <a:endParaRPr lang="en-US"/>
           </a:p>
@@ -1817,7 +1818,7 @@
           <a:p>
             <a:fld id="{F6FBCA6B-5BBD-4027-BE90-56FA1D5E4F5A}" type="datetimeFigureOut">
               <a:rPr lang="en-US" smtClean="0"/>
-              <a:t>12/28/2023</a:t>
+              <a:t>1/1/2024</a:t>
             </a:fld>
             <a:endParaRPr lang="en-US"/>
           </a:p>
@@ -1958,7 +1959,7 @@
           <a:p>
             <a:fld id="{F6FBCA6B-5BBD-4027-BE90-56FA1D5E4F5A}" type="datetimeFigureOut">
               <a:rPr lang="en-US" smtClean="0"/>
-              <a:t>12/28/2023</a:t>
+              <a:t>1/1/2024</a:t>
             </a:fld>
             <a:endParaRPr lang="en-US"/>
           </a:p>
@@ -2071,7 +2072,7 @@
           <a:p>
             <a:fld id="{F6FBCA6B-5BBD-4027-BE90-56FA1D5E4F5A}" type="datetimeFigureOut">
               <a:rPr lang="en-US" smtClean="0"/>
-              <a:t>12/28/2023</a:t>
+              <a:t>1/1/2024</a:t>
             </a:fld>
             <a:endParaRPr lang="en-US"/>
           </a:p>
@@ -2382,7 +2383,7 @@
           <a:p>
             <a:fld id="{F6FBCA6B-5BBD-4027-BE90-56FA1D5E4F5A}" type="datetimeFigureOut">
               <a:rPr lang="en-US" smtClean="0"/>
-              <a:t>12/28/2023</a:t>
+              <a:t>1/1/2024</a:t>
             </a:fld>
             <a:endParaRPr lang="en-US"/>
           </a:p>
@@ -2670,7 +2671,7 @@
           <a:p>
             <a:fld id="{F6FBCA6B-5BBD-4027-BE90-56FA1D5E4F5A}" type="datetimeFigureOut">
               <a:rPr lang="en-US" smtClean="0"/>
-              <a:t>12/28/2023</a:t>
+              <a:t>1/1/2024</a:t>
             </a:fld>
             <a:endParaRPr lang="en-US"/>
           </a:p>
@@ -2911,7 +2912,7 @@
           <a:p>
             <a:fld id="{F6FBCA6B-5BBD-4027-BE90-56FA1D5E4F5A}" type="datetimeFigureOut">
               <a:rPr lang="en-US" smtClean="0"/>
-              <a:t>12/28/2023</a:t>
+              <a:t>1/1/2024</a:t>
             </a:fld>
             <a:endParaRPr lang="en-US"/>
           </a:p>
@@ -7655,6 +7656,396 @@
 </p:sld>
 </file>
 
+<file path=ppt/slides/slide4.xml><?xml version="1.0" encoding="utf-8"?>
+<p:sld xmlns:a="http://schemas.openxmlformats.org/drawingml/2006/main" xmlns:r="http://schemas.openxmlformats.org/officeDocument/2006/relationships" xmlns:p="http://schemas.openxmlformats.org/presentationml/2006/main">
+  <p:cSld>
+    <p:spTree>
+      <p:nvGrpSpPr>
+        <p:cNvPr id="1" name=""/>
+        <p:cNvGrpSpPr/>
+        <p:nvPr/>
+      </p:nvGrpSpPr>
+      <p:grpSpPr>
+        <a:xfrm>
+          <a:off x="0" y="0"/>
+          <a:ext cx="0" cy="0"/>
+          <a:chOff x="0" y="0"/>
+          <a:chExt cx="0" cy="0"/>
+        </a:xfrm>
+      </p:grpSpPr>
+      <p:sp>
+        <p:nvSpPr>
+          <p:cNvPr id="4" name="Rectangle: Rounded Corners 3">
+            <a:extLst>
+              <a:ext uri="{FF2B5EF4-FFF2-40B4-BE49-F238E27FC236}">
+                <a16:creationId xmlns:a16="http://schemas.microsoft.com/office/drawing/2014/main" id="{1E82D180-285A-5D7F-58ED-2046A14B566A}"/>
+              </a:ext>
+            </a:extLst>
+          </p:cNvPr>
+          <p:cNvSpPr/>
+          <p:nvPr/>
+        </p:nvSpPr>
+        <p:spPr>
+          <a:xfrm>
+            <a:off x="2485854" y="1839750"/>
+            <a:ext cx="4352982" cy="1779522"/>
+          </a:xfrm>
+          <a:prstGeom prst="roundRect">
+            <a:avLst/>
+          </a:prstGeom>
+        </p:spPr>
+        <p:style>
+          <a:lnRef idx="2">
+            <a:schemeClr val="accent5"/>
+          </a:lnRef>
+          <a:fillRef idx="1">
+            <a:schemeClr val="lt1"/>
+          </a:fillRef>
+          <a:effectRef idx="0">
+            <a:schemeClr val="accent5"/>
+          </a:effectRef>
+          <a:fontRef idx="minor">
+            <a:schemeClr val="dk1"/>
+          </a:fontRef>
+        </p:style>
+        <p:txBody>
+          <a:bodyPr rtlCol="0" anchor="ctr"/>
+          <a:lstStyle/>
+          <a:p>
+            <a:pPr algn="ctr"/>
+            <a:endParaRPr lang="en-US" dirty="0"/>
+          </a:p>
+        </p:txBody>
+      </p:sp>
+      <p:sp>
+        <p:nvSpPr>
+          <p:cNvPr id="5" name="TextBox 4">
+            <a:extLst>
+              <a:ext uri="{FF2B5EF4-FFF2-40B4-BE49-F238E27FC236}">
+                <a16:creationId xmlns:a16="http://schemas.microsoft.com/office/drawing/2014/main" id="{AD83BBFE-E30A-C91E-D702-4EC48E5E6434}"/>
+              </a:ext>
+            </a:extLst>
+          </p:cNvPr>
+          <p:cNvSpPr txBox="1"/>
+          <p:nvPr/>
+        </p:nvSpPr>
+        <p:spPr>
+          <a:xfrm>
+            <a:off x="3806349" y="1193419"/>
+            <a:ext cx="1284904" cy="646331"/>
+          </a:xfrm>
+          <a:prstGeom prst="rect">
+            <a:avLst/>
+          </a:prstGeom>
+          <a:noFill/>
+        </p:spPr>
+        <p:txBody>
+          <a:bodyPr wrap="none" rtlCol="0">
+            <a:spAutoFit/>
+          </a:bodyPr>
+          <a:lstStyle/>
+          <a:p>
+            <a:r>
+              <a:rPr lang="en-US" sz="3600" b="1" dirty="0">
+                <a:solidFill>
+                  <a:srgbClr val="0078D4"/>
+                </a:solidFill>
+              </a:rPr>
+              <a:t>Azure</a:t>
+            </a:r>
+          </a:p>
+        </p:txBody>
+      </p:sp>
+      <p:pic>
+        <p:nvPicPr>
+          <p:cNvPr id="7" name="Graphic 6">
+            <a:extLst>
+              <a:ext uri="{FF2B5EF4-FFF2-40B4-BE49-F238E27FC236}">
+                <a16:creationId xmlns:a16="http://schemas.microsoft.com/office/drawing/2014/main" id="{A3237E82-2ABF-C06C-7215-4D419EF8AEB7}"/>
+              </a:ext>
+            </a:extLst>
+          </p:cNvPr>
+          <p:cNvPicPr>
+            <a:picLocks noChangeAspect="1"/>
+          </p:cNvPicPr>
+          <p:nvPr/>
+        </p:nvPicPr>
+        <p:blipFill>
+          <a:blip r:embed="rId2">
+            <a:extLst>
+              <a:ext uri="{28A0092B-C50C-407E-A947-70E740481C1C}">
+                <a14:useLocalDpi xmlns:a14="http://schemas.microsoft.com/office/drawing/2010/main" val="0"/>
+              </a:ext>
+              <a:ext uri="{96DAC541-7B7A-43D3-8B79-37D633B846F1}">
+                <asvg:svgBlip xmlns:asvg="http://schemas.microsoft.com/office/drawing/2016/SVG/main" r:embed="rId3"/>
+              </a:ext>
+            </a:extLst>
+          </a:blip>
+          <a:stretch>
+            <a:fillRect/>
+          </a:stretch>
+        </p:blipFill>
+        <p:spPr>
+          <a:xfrm>
+            <a:off x="3119235" y="2028654"/>
+            <a:ext cx="914400" cy="914400"/>
+          </a:xfrm>
+          <a:prstGeom prst="rect">
+            <a:avLst/>
+          </a:prstGeom>
+        </p:spPr>
+      </p:pic>
+      <p:pic>
+        <p:nvPicPr>
+          <p:cNvPr id="10" name="Graphic 9">
+            <a:extLst>
+              <a:ext uri="{FF2B5EF4-FFF2-40B4-BE49-F238E27FC236}">
+                <a16:creationId xmlns:a16="http://schemas.microsoft.com/office/drawing/2014/main" id="{A8048ECF-AB1E-0EAE-E1A8-2E2121BE253B}"/>
+              </a:ext>
+            </a:extLst>
+          </p:cNvPr>
+          <p:cNvPicPr>
+            <a:picLocks noChangeAspect="1"/>
+          </p:cNvPicPr>
+          <p:nvPr/>
+        </p:nvPicPr>
+        <p:blipFill>
+          <a:blip r:embed="rId4">
+            <a:extLst>
+              <a:ext uri="{28A0092B-C50C-407E-A947-70E740481C1C}">
+                <a14:useLocalDpi xmlns:a14="http://schemas.microsoft.com/office/drawing/2010/main" val="0"/>
+              </a:ext>
+              <a:ext uri="{96DAC541-7B7A-43D3-8B79-37D633B846F1}">
+                <asvg:svgBlip xmlns:asvg="http://schemas.microsoft.com/office/drawing/2016/SVG/main" r:embed="rId5"/>
+              </a:ext>
+            </a:extLst>
+          </a:blip>
+          <a:stretch>
+            <a:fillRect/>
+          </a:stretch>
+        </p:blipFill>
+        <p:spPr>
+          <a:xfrm>
+            <a:off x="971035" y="2028654"/>
+            <a:ext cx="914400" cy="914400"/>
+          </a:xfrm>
+          <a:prstGeom prst="rect">
+            <a:avLst/>
+          </a:prstGeom>
+        </p:spPr>
+      </p:pic>
+      <p:pic>
+        <p:nvPicPr>
+          <p:cNvPr id="11" name="Graphic 10">
+            <a:extLst>
+              <a:ext uri="{FF2B5EF4-FFF2-40B4-BE49-F238E27FC236}">
+                <a16:creationId xmlns:a16="http://schemas.microsoft.com/office/drawing/2014/main" id="{323D7856-4BC5-B072-2E8C-D67928CE5AE3}"/>
+              </a:ext>
+            </a:extLst>
+          </p:cNvPr>
+          <p:cNvPicPr>
+            <a:picLocks noChangeAspect="1"/>
+          </p:cNvPicPr>
+          <p:nvPr/>
+        </p:nvPicPr>
+        <p:blipFill>
+          <a:blip r:embed="rId6">
+            <a:extLst>
+              <a:ext uri="{28A0092B-C50C-407E-A947-70E740481C1C}">
+                <a14:useLocalDpi xmlns:a14="http://schemas.microsoft.com/office/drawing/2010/main" val="0"/>
+              </a:ext>
+              <a:ext uri="{96DAC541-7B7A-43D3-8B79-37D633B846F1}">
+                <asvg:svgBlip xmlns:asvg="http://schemas.microsoft.com/office/drawing/2016/SVG/main" r:embed="rId7"/>
+              </a:ext>
+            </a:extLst>
+          </a:blip>
+          <a:stretch>
+            <a:fillRect/>
+          </a:stretch>
+        </p:blipFill>
+        <p:spPr>
+          <a:xfrm>
+            <a:off x="5348599" y="2028654"/>
+            <a:ext cx="914400" cy="914400"/>
+          </a:xfrm>
+          <a:prstGeom prst="rect">
+            <a:avLst/>
+          </a:prstGeom>
+        </p:spPr>
+      </p:pic>
+      <p:sp>
+        <p:nvSpPr>
+          <p:cNvPr id="12" name="TextBox 11">
+            <a:extLst>
+              <a:ext uri="{FF2B5EF4-FFF2-40B4-BE49-F238E27FC236}">
+                <a16:creationId xmlns:a16="http://schemas.microsoft.com/office/drawing/2014/main" id="{0033202F-76C9-8228-26CE-2A8E41BDC7B0}"/>
+              </a:ext>
+            </a:extLst>
+          </p:cNvPr>
+          <p:cNvSpPr txBox="1"/>
+          <p:nvPr/>
+        </p:nvSpPr>
+        <p:spPr>
+          <a:xfrm>
+            <a:off x="2653490" y="3016973"/>
+            <a:ext cx="1845890" cy="369332"/>
+          </a:xfrm>
+          <a:prstGeom prst="rect">
+            <a:avLst/>
+          </a:prstGeom>
+          <a:noFill/>
+        </p:spPr>
+        <p:txBody>
+          <a:bodyPr wrap="none" rtlCol="0">
+            <a:spAutoFit/>
+          </a:bodyPr>
+          <a:lstStyle/>
+          <a:p>
+            <a:r>
+              <a:rPr lang="en-US" dirty="0"/>
+              <a:t>App Service - PHP</a:t>
+            </a:r>
+          </a:p>
+        </p:txBody>
+      </p:sp>
+      <p:sp>
+        <p:nvSpPr>
+          <p:cNvPr id="13" name="TextBox 12">
+            <a:extLst>
+              <a:ext uri="{FF2B5EF4-FFF2-40B4-BE49-F238E27FC236}">
+                <a16:creationId xmlns:a16="http://schemas.microsoft.com/office/drawing/2014/main" id="{E68C1F5F-CDF9-ED6C-920D-6F3DC35DF19A}"/>
+              </a:ext>
+            </a:extLst>
+          </p:cNvPr>
+          <p:cNvSpPr txBox="1"/>
+          <p:nvPr/>
+        </p:nvSpPr>
+        <p:spPr>
+          <a:xfrm>
+            <a:off x="4882368" y="2957997"/>
+            <a:ext cx="1956467" cy="646331"/>
+          </a:xfrm>
+          <a:prstGeom prst="rect">
+            <a:avLst/>
+          </a:prstGeom>
+          <a:noFill/>
+        </p:spPr>
+        <p:txBody>
+          <a:bodyPr wrap="square" rtlCol="0">
+            <a:spAutoFit/>
+          </a:bodyPr>
+          <a:lstStyle/>
+          <a:p>
+            <a:pPr algn="ctr"/>
+            <a:r>
+              <a:rPr lang="en-US" dirty="0"/>
+              <a:t>PostgreSQL </a:t>
+            </a:r>
+          </a:p>
+          <a:p>
+            <a:pPr algn="ctr"/>
+            <a:r>
+              <a:rPr lang="en-US" dirty="0"/>
+              <a:t>Flexible Server</a:t>
+            </a:r>
+          </a:p>
+        </p:txBody>
+      </p:sp>
+      <p:cxnSp>
+        <p:nvCxnSpPr>
+          <p:cNvPr id="15" name="Straight Arrow Connector 14">
+            <a:extLst>
+              <a:ext uri="{FF2B5EF4-FFF2-40B4-BE49-F238E27FC236}">
+                <a16:creationId xmlns:a16="http://schemas.microsoft.com/office/drawing/2014/main" id="{722A8DFB-879D-830A-1782-E9813E92BA76}"/>
+              </a:ext>
+            </a:extLst>
+          </p:cNvPr>
+          <p:cNvCxnSpPr/>
+          <p:nvPr/>
+        </p:nvCxnSpPr>
+        <p:spPr>
+          <a:xfrm>
+            <a:off x="1885435" y="2480378"/>
+            <a:ext cx="1164390" cy="0"/>
+          </a:xfrm>
+          <a:prstGeom prst="straightConnector1">
+            <a:avLst/>
+          </a:prstGeom>
+          <a:ln>
+            <a:headEnd type="triangle"/>
+            <a:tailEnd type="triangle"/>
+          </a:ln>
+        </p:spPr>
+        <p:style>
+          <a:lnRef idx="1">
+            <a:schemeClr val="accent1"/>
+          </a:lnRef>
+          <a:fillRef idx="0">
+            <a:schemeClr val="accent1"/>
+          </a:fillRef>
+          <a:effectRef idx="0">
+            <a:schemeClr val="accent1"/>
+          </a:effectRef>
+          <a:fontRef idx="minor">
+            <a:schemeClr val="tx1"/>
+          </a:fontRef>
+        </p:style>
+      </p:cxnSp>
+      <p:cxnSp>
+        <p:nvCxnSpPr>
+          <p:cNvPr id="17" name="Straight Arrow Connector 16">
+            <a:extLst>
+              <a:ext uri="{FF2B5EF4-FFF2-40B4-BE49-F238E27FC236}">
+                <a16:creationId xmlns:a16="http://schemas.microsoft.com/office/drawing/2014/main" id="{1132D6B2-B23A-6426-CACA-A109B0FA6A5C}"/>
+              </a:ext>
+            </a:extLst>
+          </p:cNvPr>
+          <p:cNvCxnSpPr>
+            <a:stCxn id="7" idx="3"/>
+          </p:cNvCxnSpPr>
+          <p:nvPr/>
+        </p:nvCxnSpPr>
+        <p:spPr>
+          <a:xfrm flipV="1">
+            <a:off x="4033635" y="2480378"/>
+            <a:ext cx="1436339" cy="5476"/>
+          </a:xfrm>
+          <a:prstGeom prst="straightConnector1">
+            <a:avLst/>
+          </a:prstGeom>
+          <a:ln>
+            <a:headEnd type="triangle"/>
+            <a:tailEnd type="triangle"/>
+          </a:ln>
+        </p:spPr>
+        <p:style>
+          <a:lnRef idx="1">
+            <a:schemeClr val="accent1"/>
+          </a:lnRef>
+          <a:fillRef idx="0">
+            <a:schemeClr val="accent1"/>
+          </a:fillRef>
+          <a:effectRef idx="0">
+            <a:schemeClr val="accent1"/>
+          </a:effectRef>
+          <a:fontRef idx="minor">
+            <a:schemeClr val="tx1"/>
+          </a:fontRef>
+        </p:style>
+      </p:cxnSp>
+    </p:spTree>
+    <p:extLst>
+      <p:ext uri="{BB962C8B-B14F-4D97-AF65-F5344CB8AC3E}">
+        <p14:creationId xmlns:p14="http://schemas.microsoft.com/office/powerpoint/2010/main" val="2474307524"/>
+      </p:ext>
+    </p:extLst>
+  </p:cSld>
+  <p:clrMapOvr>
+    <a:masterClrMapping/>
+  </p:clrMapOvr>
+</p:sld>
+</file>
+
 <file path=ppt/theme/theme1.xml><?xml version="1.0" encoding="utf-8"?>
 <a:theme xmlns:a="http://schemas.openxmlformats.org/drawingml/2006/main" name="Office Theme">
   <a:themeElements>

</xml_diff>